<commit_message>
ROC & ppt chnages
</commit_message>
<xml_diff>
--- a/Predicting_Credit_Card_defaults.pptx
+++ b/Predicting_Credit_Card_defaults.pptx
@@ -7,11 +7,13 @@
   <p:sldIdLst>
     <p:sldId id="256" r:id="rId2"/>
     <p:sldId id="257" r:id="rId3"/>
-    <p:sldId id="258" r:id="rId4"/>
-    <p:sldId id="259" r:id="rId5"/>
-    <p:sldId id="260" r:id="rId6"/>
-    <p:sldId id="261" r:id="rId7"/>
-    <p:sldId id="262" r:id="rId8"/>
+    <p:sldId id="264" r:id="rId4"/>
+    <p:sldId id="265" r:id="rId5"/>
+    <p:sldId id="258" r:id="rId6"/>
+    <p:sldId id="259" r:id="rId7"/>
+    <p:sldId id="260" r:id="rId8"/>
+    <p:sldId id="261" r:id="rId9"/>
+    <p:sldId id="262" r:id="rId10"/>
   </p:sldIdLst>
   <p:sldSz cx="12192000" cy="6858000"/>
   <p:notesSz cx="6858000" cy="9144000"/>
@@ -621,7 +623,7 @@
             <a:fld id="{B61BEF0D-F0BB-DE4B-95CE-6DB70DBA9567}" type="datetimeFigureOut">
               <a:rPr lang="en-US" dirty="0"/>
               <a:pPr/>
-              <a:t>3/6/16</a:t>
+              <a:t>3/7/16</a:t>
             </a:fld>
             <a:endParaRPr lang="en-US" dirty="0"/>
           </a:p>
@@ -914,7 +916,7 @@
             <a:fld id="{B61BEF0D-F0BB-DE4B-95CE-6DB70DBA9567}" type="datetimeFigureOut">
               <a:rPr lang="en-US" dirty="0"/>
               <a:pPr/>
-              <a:t>3/6/16</a:t>
+              <a:t>3/7/16</a:t>
             </a:fld>
             <a:endParaRPr lang="en-US" dirty="0"/>
           </a:p>
@@ -1159,7 +1161,7 @@
             <a:fld id="{B61BEF0D-F0BB-DE4B-95CE-6DB70DBA9567}" type="datetimeFigureOut">
               <a:rPr lang="en-US" dirty="0"/>
               <a:pPr/>
-              <a:t>3/6/16</a:t>
+              <a:t>3/7/16</a:t>
             </a:fld>
             <a:endParaRPr lang="en-US" dirty="0"/>
           </a:p>
@@ -1696,7 +1698,7 @@
             <a:fld id="{B61BEF0D-F0BB-DE4B-95CE-6DB70DBA9567}" type="datetimeFigureOut">
               <a:rPr lang="en-US" dirty="0"/>
               <a:pPr/>
-              <a:t>3/6/16</a:t>
+              <a:t>3/7/16</a:t>
             </a:fld>
             <a:endParaRPr lang="en-US" dirty="0"/>
           </a:p>
@@ -1941,7 +1943,7 @@
             <a:fld id="{B61BEF0D-F0BB-DE4B-95CE-6DB70DBA9567}" type="datetimeFigureOut">
               <a:rPr lang="en-US" dirty="0"/>
               <a:pPr/>
-              <a:t>3/6/16</a:t>
+              <a:t>3/7/16</a:t>
             </a:fld>
             <a:endParaRPr lang="en-US" dirty="0"/>
           </a:p>
@@ -2470,7 +2472,7 @@
             <a:fld id="{B61BEF0D-F0BB-DE4B-95CE-6DB70DBA9567}" type="datetimeFigureOut">
               <a:rPr lang="en-US" dirty="0"/>
               <a:pPr/>
-              <a:t>3/6/16</a:t>
+              <a:t>3/7/16</a:t>
             </a:fld>
             <a:endParaRPr lang="en-US" dirty="0"/>
           </a:p>
@@ -2764,7 +2766,7 @@
             <a:fld id="{B61BEF0D-F0BB-DE4B-95CE-6DB70DBA9567}" type="datetimeFigureOut">
               <a:rPr lang="en-US" dirty="0"/>
               <a:pPr/>
-              <a:t>3/6/16</a:t>
+              <a:t>3/7/16</a:t>
             </a:fld>
             <a:endParaRPr lang="en-US" dirty="0"/>
           </a:p>
@@ -2935,7 +2937,7 @@
             <a:fld id="{B61BEF0D-F0BB-DE4B-95CE-6DB70DBA9567}" type="datetimeFigureOut">
               <a:rPr lang="en-US" dirty="0"/>
               <a:pPr/>
-              <a:t>3/6/16</a:t>
+              <a:t>3/7/16</a:t>
             </a:fld>
             <a:endParaRPr lang="en-US" dirty="0"/>
           </a:p>
@@ -3112,7 +3114,7 @@
             <a:fld id="{B61BEF0D-F0BB-DE4B-95CE-6DB70DBA9567}" type="datetimeFigureOut">
               <a:rPr lang="en-US" dirty="0"/>
               <a:pPr/>
-              <a:t>3/6/16</a:t>
+              <a:t>3/7/16</a:t>
             </a:fld>
             <a:endParaRPr lang="en-US" dirty="0"/>
           </a:p>
@@ -3279,7 +3281,7 @@
             <a:fld id="{B61BEF0D-F0BB-DE4B-95CE-6DB70DBA9567}" type="datetimeFigureOut">
               <a:rPr lang="en-US" dirty="0"/>
               <a:pPr/>
-              <a:t>3/6/16</a:t>
+              <a:t>3/7/16</a:t>
             </a:fld>
             <a:endParaRPr lang="en-US" dirty="0"/>
           </a:p>
@@ -3527,7 +3529,7 @@
             <a:fld id="{B61BEF0D-F0BB-DE4B-95CE-6DB70DBA9567}" type="datetimeFigureOut">
               <a:rPr lang="en-US" dirty="0"/>
               <a:pPr/>
-              <a:t>3/6/16</a:t>
+              <a:t>3/7/16</a:t>
             </a:fld>
             <a:endParaRPr lang="en-US" dirty="0"/>
           </a:p>
@@ -3821,7 +3823,7 @@
             <a:fld id="{B61BEF0D-F0BB-DE4B-95CE-6DB70DBA9567}" type="datetimeFigureOut">
               <a:rPr lang="en-US" dirty="0"/>
               <a:pPr/>
-              <a:t>3/6/16</a:t>
+              <a:t>3/7/16</a:t>
             </a:fld>
             <a:endParaRPr lang="en-US" dirty="0"/>
           </a:p>
@@ -4260,7 +4262,7 @@
             <a:fld id="{B61BEF0D-F0BB-DE4B-95CE-6DB70DBA9567}" type="datetimeFigureOut">
               <a:rPr lang="en-US" dirty="0"/>
               <a:pPr/>
-              <a:t>3/6/16</a:t>
+              <a:t>3/7/16</a:t>
             </a:fld>
             <a:endParaRPr lang="en-US" dirty="0"/>
           </a:p>
@@ -4375,7 +4377,7 @@
             <a:fld id="{B61BEF0D-F0BB-DE4B-95CE-6DB70DBA9567}" type="datetimeFigureOut">
               <a:rPr lang="en-US" dirty="0"/>
               <a:pPr/>
-              <a:t>3/6/16</a:t>
+              <a:t>3/7/16</a:t>
             </a:fld>
             <a:endParaRPr lang="en-US" dirty="0"/>
           </a:p>
@@ -4467,7 +4469,7 @@
             <a:fld id="{B61BEF0D-F0BB-DE4B-95CE-6DB70DBA9567}" type="datetimeFigureOut">
               <a:rPr lang="en-US" dirty="0"/>
               <a:pPr/>
-              <a:t>3/6/16</a:t>
+              <a:t>3/7/16</a:t>
             </a:fld>
             <a:endParaRPr lang="en-US" dirty="0"/>
           </a:p>
@@ -4747,7 +4749,7 @@
             <a:fld id="{B61BEF0D-F0BB-DE4B-95CE-6DB70DBA9567}" type="datetimeFigureOut">
               <a:rPr lang="en-US" dirty="0"/>
               <a:pPr/>
-              <a:t>3/6/16</a:t>
+              <a:t>3/7/16</a:t>
             </a:fld>
             <a:endParaRPr lang="en-US" dirty="0"/>
           </a:p>
@@ -5035,7 +5037,7 @@
             <a:fld id="{B61BEF0D-F0BB-DE4B-95CE-6DB70DBA9567}" type="datetimeFigureOut">
               <a:rPr lang="en-US" dirty="0"/>
               <a:pPr/>
-              <a:t>3/6/16</a:t>
+              <a:t>3/7/16</a:t>
             </a:fld>
             <a:endParaRPr lang="en-US" dirty="0"/>
           </a:p>
@@ -5562,7 +5564,7 @@
             <a:fld id="{B61BEF0D-F0BB-DE4B-95CE-6DB70DBA9567}" type="datetimeFigureOut">
               <a:rPr lang="en-US" dirty="0"/>
               <a:pPr/>
-              <a:t>3/6/16</a:t>
+              <a:t>3/7/16</a:t>
             </a:fld>
             <a:endParaRPr lang="en-US" dirty="0"/>
           </a:p>
@@ -6274,79 +6276,50 @@
             </a:r>
           </a:p>
           <a:p>
+            <a:r>
+              <a:rPr lang="en-US" dirty="0" smtClean="0"/>
+              <a:t>1 Response variable</a:t>
+            </a:r>
+          </a:p>
+          <a:p>
             <a:pPr lvl="1"/>
             <a:r>
               <a:rPr lang="en-US" dirty="0" smtClean="0"/>
-              <a:t>X1 – X5: Credit given, gender, education level, marital status, age</a:t>
+              <a:t> </a:t>
+            </a:r>
+            <a:r>
+              <a:rPr lang="en-US" dirty="0" smtClean="0"/>
+              <a:t>Y = 1 (yes defaulted) , Y = 0 (no)</a:t>
             </a:r>
           </a:p>
           <a:p>
             <a:pPr lvl="1"/>
             <a:r>
               <a:rPr lang="en-US" dirty="0" smtClean="0"/>
-              <a:t>X6 –X11: Monthly history of past payment | </a:t>
-            </a:r>
-            <a:r>
-              <a:rPr lang="en-US" dirty="0"/>
-              <a:t> </a:t>
+              <a:t>22% defaulted (6636 / 30,000</a:t>
             </a:r>
             <a:r>
               <a:rPr lang="en-US" dirty="0" smtClean="0"/>
-              <a:t>X12 – X17: Monthly bill statement amount </a:t>
-            </a:r>
-          </a:p>
-          <a:p>
-            <a:pPr lvl="1"/>
+              <a:t>)</a:t>
+            </a:r>
+          </a:p>
+          <a:p>
             <a:r>
               <a:rPr lang="en-US" dirty="0" smtClean="0"/>
-              <a:t>X18 – X23: Monthly previous payments</a:t>
-            </a:r>
-          </a:p>
-          <a:p>
+              <a:t>Source of data: </a:t>
+            </a:r>
+            <a:r>
+              <a:rPr lang="en-US" i="1" dirty="0" smtClean="0"/>
+              <a:t>UC-Irvine Machine Learning Repository</a:t>
+            </a:r>
             <a:r>
               <a:rPr lang="en-US" dirty="0" smtClean="0"/>
-              <a:t>Response variable: Y = 1 (yes defaulted) , Y = 0 (no)</a:t>
-            </a:r>
-          </a:p>
-          <a:p>
-            <a:pPr lvl="1"/>
-            <a:r>
-              <a:rPr lang="en-US" dirty="0" smtClean="0"/>
-              <a:t>22% defaulted (6636 / 30,000)</a:t>
-            </a:r>
-          </a:p>
-        </p:txBody>
-      </p:sp>
-      <p:pic>
-        <p:nvPicPr>
-          <p:cNvPr id="4" name="Picture 3"/>
-          <p:cNvPicPr>
-            <a:picLocks noChangeAspect="1"/>
-          </p:cNvPicPr>
-          <p:nvPr/>
-        </p:nvPicPr>
-        <p:blipFill>
-          <a:blip r:embed="rId2">
-            <a:extLst>
-              <a:ext uri="{28A0092B-C50C-407E-A947-70E740481C1C}">
-                <a14:useLocalDpi xmlns:a14="http://schemas.microsoft.com/office/drawing/2010/main" val="0"/>
-              </a:ext>
-            </a:extLst>
-          </a:blip>
-          <a:stretch>
-            <a:fillRect/>
-          </a:stretch>
-        </p:blipFill>
-        <p:spPr>
-          <a:xfrm>
-            <a:off x="9549763" y="4874366"/>
-            <a:ext cx="1953260" cy="1546982"/>
-          </a:xfrm>
-          <a:prstGeom prst="rect">
-            <a:avLst/>
-          </a:prstGeom>
-        </p:spPr>
-      </p:pic>
+              <a:t>, Jan-16</a:t>
+            </a:r>
+            <a:endParaRPr lang="en-US" dirty="0" smtClean="0"/>
+          </a:p>
+        </p:txBody>
+      </p:sp>
     </p:spTree>
     <p:extLst>
       <p:ext uri="{BB962C8B-B14F-4D97-AF65-F5344CB8AC3E}">
@@ -6400,83 +6373,224 @@
           <a:lstStyle/>
           <a:p>
             <a:r>
+              <a:rPr lang="en-US" smtClean="0"/>
+              <a:t>Data Sample (n=5)</a:t>
+            </a:r>
+            <a:endParaRPr lang="en-US" dirty="0"/>
+          </a:p>
+        </p:txBody>
+      </p:sp>
+      <p:pic>
+        <p:nvPicPr>
+          <p:cNvPr id="3" name="Picture 2"/>
+          <p:cNvPicPr>
+            <a:picLocks noChangeAspect="1"/>
+          </p:cNvPicPr>
+          <p:nvPr/>
+        </p:nvPicPr>
+        <p:blipFill rotWithShape="1">
+          <a:blip r:embed="rId2">
+            <a:extLst>
+              <a:ext uri="{28A0092B-C50C-407E-A947-70E740481C1C}">
+                <a14:useLocalDpi xmlns:a14="http://schemas.microsoft.com/office/drawing/2010/main" val="0"/>
+              </a:ext>
+            </a:extLst>
+          </a:blip>
+          <a:srcRect l="2850" t="3475" r="6360" b="13990"/>
+          <a:stretch/>
+        </p:blipFill>
+        <p:spPr>
+          <a:xfrm>
+            <a:off x="2145644" y="2376653"/>
+            <a:ext cx="8696046" cy="2873476"/>
+          </a:xfrm>
+          <a:prstGeom prst="rect">
+            <a:avLst/>
+          </a:prstGeom>
+        </p:spPr>
+      </p:pic>
+      <p:sp>
+        <p:nvSpPr>
+          <p:cNvPr id="4" name="Oval 3"/>
+          <p:cNvSpPr/>
+          <p:nvPr/>
+        </p:nvSpPr>
+        <p:spPr>
+          <a:xfrm>
+            <a:off x="10488122" y="3791712"/>
+            <a:ext cx="353568" cy="1621536"/>
+          </a:xfrm>
+          <a:prstGeom prst="ellipse">
+            <a:avLst/>
+          </a:prstGeom>
+          <a:noFill/>
+          <a:ln w="38100">
+            <a:solidFill>
+              <a:schemeClr val="accent1"/>
+            </a:solidFill>
+          </a:ln>
+        </p:spPr>
+        <p:style>
+          <a:lnRef idx="2">
+            <a:schemeClr val="accent1">
+              <a:shade val="50000"/>
+            </a:schemeClr>
+          </a:lnRef>
+          <a:fillRef idx="1">
+            <a:schemeClr val="accent1"/>
+          </a:fillRef>
+          <a:effectRef idx="0">
+            <a:schemeClr val="accent1"/>
+          </a:effectRef>
+          <a:fontRef idx="minor">
+            <a:schemeClr val="lt1"/>
+          </a:fontRef>
+        </p:style>
+        <p:txBody>
+          <a:bodyPr rtlCol="0" anchor="ctr"/>
+          <a:lstStyle/>
+          <a:p>
+            <a:pPr algn="ctr"/>
+            <a:endParaRPr lang="en-US"/>
+          </a:p>
+        </p:txBody>
+      </p:sp>
+      <p:sp>
+        <p:nvSpPr>
+          <p:cNvPr id="6" name="Rectangle 5"/>
+          <p:cNvSpPr/>
+          <p:nvPr/>
+        </p:nvSpPr>
+        <p:spPr>
+          <a:xfrm>
+            <a:off x="2810182" y="5413248"/>
+            <a:ext cx="7366970" cy="1200329"/>
+          </a:xfrm>
+          <a:prstGeom prst="rect">
+            <a:avLst/>
+          </a:prstGeom>
+        </p:spPr>
+        <p:txBody>
+          <a:bodyPr wrap="square">
+            <a:spAutoFit/>
+          </a:bodyPr>
+          <a:lstStyle/>
+          <a:p>
+            <a:pPr lvl="1"/>
+            <a:r>
               <a:rPr lang="en-US" dirty="0" smtClean="0"/>
-              <a:t>Model Accuracy</a:t>
-            </a:r>
-            <a:endParaRPr lang="en-US" dirty="0"/>
-          </a:p>
-        </p:txBody>
-      </p:sp>
-      <p:sp>
-        <p:nvSpPr>
-          <p:cNvPr id="3" name="Content Placeholder 2"/>
-          <p:cNvSpPr>
-            <a:spLocks noGrp="1"/>
-          </p:cNvSpPr>
-          <p:nvPr>
-            <p:ph idx="1"/>
-          </p:nvPr>
-        </p:nvSpPr>
-        <p:spPr/>
-        <p:txBody>
-          <a:bodyPr>
-            <a:normAutofit/>
+              <a:t>X1 – X5: Credit given, gender, education level, marital status, age</a:t>
+            </a:r>
+          </a:p>
+          <a:p>
+            <a:pPr lvl="1"/>
+            <a:r>
+              <a:rPr lang="en-US" dirty="0" smtClean="0"/>
+              <a:t>X6 </a:t>
+            </a:r>
+            <a:r>
+              <a:rPr lang="en-US" dirty="0"/>
+              <a:t>–X11: </a:t>
+            </a:r>
+            <a:r>
+              <a:rPr lang="en-US" dirty="0" smtClean="0"/>
+              <a:t>Monthly payment status</a:t>
+            </a:r>
+          </a:p>
+          <a:p>
+            <a:pPr lvl="1"/>
+            <a:r>
+              <a:rPr lang="en-US" dirty="0" smtClean="0"/>
+              <a:t>X12 </a:t>
+            </a:r>
+            <a:r>
+              <a:rPr lang="en-US" dirty="0"/>
+              <a:t>– X17: Monthly bill </a:t>
+            </a:r>
+            <a:r>
+              <a:rPr lang="en-US" dirty="0" smtClean="0"/>
+              <a:t>amounts </a:t>
+            </a:r>
+            <a:endParaRPr lang="en-US" dirty="0"/>
+          </a:p>
+          <a:p>
+            <a:pPr lvl="1"/>
+            <a:r>
+              <a:rPr lang="en-US" dirty="0"/>
+              <a:t>X18 – X23: Monthly </a:t>
+            </a:r>
+            <a:r>
+              <a:rPr lang="en-US" dirty="0" smtClean="0"/>
+              <a:t>payments</a:t>
+            </a:r>
+            <a:endParaRPr lang="en-US" dirty="0"/>
+          </a:p>
+        </p:txBody>
+      </p:sp>
+      <p:sp>
+        <p:nvSpPr>
+          <p:cNvPr id="7" name="Rectangle 6"/>
+          <p:cNvSpPr/>
+          <p:nvPr/>
+        </p:nvSpPr>
+        <p:spPr>
+          <a:xfrm>
+            <a:off x="9720026" y="5513832"/>
+            <a:ext cx="2703622" cy="923330"/>
+          </a:xfrm>
+          <a:prstGeom prst="rect">
+            <a:avLst/>
+          </a:prstGeom>
+        </p:spPr>
+        <p:txBody>
+          <a:bodyPr wrap="square">
+            <a:spAutoFit/>
           </a:bodyPr>
           <a:lstStyle/>
           <a:p>
-            <a:r>
-              <a:rPr lang="en-US" dirty="0" smtClean="0"/>
-              <a:t>Standard measure: Error rate</a:t>
-            </a:r>
-            <a:endParaRPr lang="en-US" dirty="0" smtClean="0"/>
-          </a:p>
-          <a:p>
-            <a:r>
-              <a:rPr lang="en-US" dirty="0" smtClean="0"/>
-              <a:t>Best measure: area ratio of lift </a:t>
-            </a:r>
-            <a:r>
-              <a:rPr lang="en-US" dirty="0" smtClean="0"/>
-              <a:t>chart</a:t>
-            </a:r>
-          </a:p>
-          <a:p>
-            <a:r>
-              <a:rPr lang="en-US" dirty="0" smtClean="0"/>
-              <a:t>What is a lift chart?</a:t>
-            </a:r>
-          </a:p>
-          <a:p>
             <a:pPr lvl="1"/>
             <a:r>
-              <a:rPr lang="en-US" dirty="0" smtClean="0"/>
-              <a:t>Any improvement from random guess is </a:t>
-            </a:r>
-            <a:r>
-              <a:rPr lang="en-US" i="1" dirty="0" smtClean="0"/>
-              <a:t>lift</a:t>
+              <a:rPr lang="en-US" i="1" dirty="0" smtClean="0">
+                <a:solidFill>
+                  <a:schemeClr val="accent1"/>
+                </a:solidFill>
+              </a:rPr>
+              <a:t>In this small sample, </a:t>
             </a:r>
           </a:p>
           <a:p>
             <a:pPr lvl="1"/>
             <a:r>
-              <a:rPr lang="en-US" dirty="0" smtClean="0"/>
-              <a:t>Ideal curve has 100% classification accuracy</a:t>
+              <a:rPr lang="en-US" i="1" dirty="0" smtClean="0">
+                <a:solidFill>
+                  <a:schemeClr val="accent1"/>
+                </a:solidFill>
+              </a:rPr>
+              <a:t>3 of 5 cardholders </a:t>
             </a:r>
           </a:p>
           <a:p>
             <a:pPr lvl="1"/>
-            <a:endParaRPr lang="en-US" dirty="0" smtClean="0"/>
-          </a:p>
-          <a:p>
-            <a:endParaRPr lang="en-US" dirty="0" smtClean="0"/>
+            <a:r>
+              <a:rPr lang="en-US" i="1" dirty="0" smtClean="0">
+                <a:solidFill>
+                  <a:schemeClr val="accent1"/>
+                </a:solidFill>
+              </a:rPr>
+              <a:t>defaulted</a:t>
+            </a:r>
+            <a:endParaRPr lang="en-US" i="1" dirty="0">
+              <a:solidFill>
+                <a:schemeClr val="accent1"/>
+              </a:solidFill>
+            </a:endParaRPr>
           </a:p>
         </p:txBody>
       </p:sp>
     </p:spTree>
     <p:extLst>
       <p:ext uri="{BB962C8B-B14F-4D97-AF65-F5344CB8AC3E}">
-        <p14:creationId xmlns:p14="http://schemas.microsoft.com/office/powerpoint/2010/main" val="1252872857"/>
+        <p14:creationId xmlns:p14="http://schemas.microsoft.com/office/powerpoint/2010/main" val="627798131"/>
       </p:ext>
     </p:extLst>
   </p:cSld>
@@ -6527,93 +6641,250 @@
           <a:p>
             <a:r>
               <a:rPr lang="en-US" dirty="0" smtClean="0"/>
-              <a:t>Baseline Methods</a:t>
-            </a:r>
-            <a:endParaRPr lang="en-US" dirty="0"/>
-          </a:p>
-        </p:txBody>
-      </p:sp>
-      <p:sp>
-        <p:nvSpPr>
-          <p:cNvPr id="3" name="Content Placeholder 2"/>
-          <p:cNvSpPr>
-            <a:spLocks noGrp="1"/>
-          </p:cNvSpPr>
+              <a:t>Sample Confusion Matrix</a:t>
+            </a:r>
+            <a:endParaRPr lang="en-US" dirty="0"/>
+          </a:p>
+        </p:txBody>
+      </p:sp>
+      <p:graphicFrame>
+        <p:nvGraphicFramePr>
+          <p:cNvPr id="8" name="Content Placeholder 7"/>
+          <p:cNvGraphicFramePr>
+            <a:graphicFrameLocks noGrp="1"/>
+          </p:cNvGraphicFramePr>
           <p:nvPr>
             <p:ph idx="1"/>
-          </p:nvPr>
-        </p:nvSpPr>
-        <p:spPr/>
-        <p:txBody>
-          <a:bodyPr>
-            <a:normAutofit fontScale="92500" lnSpcReduction="20000"/>
+            <p:extLst>
+              <p:ext uri="{D42A27DB-BD31-4B8C-83A1-F6EECF244321}">
+                <p14:modId xmlns:p14="http://schemas.microsoft.com/office/powerpoint/2010/main" val="1646077204"/>
+              </p:ext>
+            </p:extLst>
+          </p:nvPr>
+        </p:nvGraphicFramePr>
+        <p:xfrm>
+          <a:off x="3703170" y="2651234"/>
+          <a:ext cx="5580994" cy="1828800"/>
+        </p:xfrm>
+        <a:graphic>
+          <a:graphicData uri="http://schemas.openxmlformats.org/drawingml/2006/table">
+            <a:tbl>
+              <a:tblPr firstRow="1" bandRow="1">
+                <a:tableStyleId>{5940675A-B579-460E-94D1-54222C63F5DA}</a:tableStyleId>
+              </a:tblPr>
+              <a:tblGrid>
+                <a:gridCol w="2790497"/>
+                <a:gridCol w="2790497"/>
+              </a:tblGrid>
+              <a:tr h="370840">
+                <a:tc>
+                  <a:txBody>
+                    <a:bodyPr/>
+                    <a:lstStyle/>
+                    <a:p>
+                      <a:r>
+                        <a:rPr lang="en-US" dirty="0" smtClean="0"/>
+                        <a:t>22,296 </a:t>
+                      </a:r>
+                    </a:p>
+                    <a:p>
+                      <a:r>
+                        <a:rPr lang="en-US" dirty="0" smtClean="0"/>
+                        <a:t>(model correctly</a:t>
+                      </a:r>
+                      <a:r>
+                        <a:rPr lang="en-US" baseline="0" dirty="0" smtClean="0"/>
+                        <a:t> </a:t>
+                      </a:r>
+                    </a:p>
+                    <a:p>
+                      <a:r>
+                        <a:rPr lang="en-US" baseline="0" dirty="0" smtClean="0"/>
+                        <a:t>predicted non-default)</a:t>
+                      </a:r>
+                      <a:endParaRPr lang="en-US" dirty="0"/>
+                    </a:p>
+                  </a:txBody>
+                  <a:tcPr anchor="ctr"/>
+                </a:tc>
+                <a:tc>
+                  <a:txBody>
+                    <a:bodyPr/>
+                    <a:lstStyle/>
+                    <a:p>
+                      <a:r>
+                        <a:rPr lang="en-US" dirty="0" smtClean="0"/>
+                        <a:t>1,068</a:t>
+                      </a:r>
+                      <a:r>
+                        <a:rPr lang="en-US" baseline="0" dirty="0" smtClean="0"/>
+                        <a:t> </a:t>
+                      </a:r>
+                    </a:p>
+                    <a:p>
+                      <a:r>
+                        <a:rPr lang="en-US" baseline="0" dirty="0" smtClean="0"/>
+                        <a:t>(false positive)</a:t>
+                      </a:r>
+                      <a:endParaRPr lang="en-US" dirty="0"/>
+                    </a:p>
+                  </a:txBody>
+                  <a:tcPr anchor="ctr"/>
+                </a:tc>
+              </a:tr>
+              <a:tr h="370840">
+                <a:tc>
+                  <a:txBody>
+                    <a:bodyPr/>
+                    <a:lstStyle/>
+                    <a:p>
+                      <a:r>
+                        <a:rPr lang="en-US" dirty="0" smtClean="0"/>
+                        <a:t>4,426 </a:t>
+                      </a:r>
+                    </a:p>
+                    <a:p>
+                      <a:r>
+                        <a:rPr lang="en-US" dirty="0" smtClean="0"/>
+                        <a:t>(false negative)</a:t>
+                      </a:r>
+                      <a:endParaRPr lang="en-US" dirty="0"/>
+                    </a:p>
+                  </a:txBody>
+                  <a:tcPr anchor="ctr"/>
+                </a:tc>
+                <a:tc>
+                  <a:txBody>
+                    <a:bodyPr/>
+                    <a:lstStyle/>
+                    <a:p>
+                      <a:r>
+                        <a:rPr lang="en-US" dirty="0" smtClean="0"/>
+                        <a:t>2,210 </a:t>
+                      </a:r>
+                    </a:p>
+                    <a:p>
+                      <a:r>
+                        <a:rPr lang="en-US" dirty="0" smtClean="0"/>
+                        <a:t>(model correctly </a:t>
+                      </a:r>
+                    </a:p>
+                    <a:p>
+                      <a:r>
+                        <a:rPr lang="en-US" dirty="0" smtClean="0"/>
+                        <a:t>predicted default)</a:t>
+                      </a:r>
+                      <a:endParaRPr lang="en-US" dirty="0"/>
+                    </a:p>
+                  </a:txBody>
+                  <a:tcPr anchor="ctr"/>
+                </a:tc>
+              </a:tr>
+            </a:tbl>
+          </a:graphicData>
+        </a:graphic>
+      </p:graphicFrame>
+      <p:sp>
+        <p:nvSpPr>
+          <p:cNvPr id="9" name="Rectangle 8"/>
+          <p:cNvSpPr/>
+          <p:nvPr/>
+        </p:nvSpPr>
+        <p:spPr>
+          <a:xfrm>
+            <a:off x="7932352" y="4692869"/>
+            <a:ext cx="3308462" cy="923330"/>
+          </a:xfrm>
+          <a:prstGeom prst="rect">
+            <a:avLst/>
+          </a:prstGeom>
+        </p:spPr>
+        <p:txBody>
+          <a:bodyPr wrap="square">
+            <a:spAutoFit/>
           </a:bodyPr>
           <a:lstStyle/>
           <a:p>
-            <a:r>
-              <a:rPr lang="en-US" dirty="0"/>
-              <a:t>Data split into 2 groups, model training and validation</a:t>
-            </a:r>
-          </a:p>
-          <a:p>
-            <a:r>
-              <a:rPr lang="en-US" dirty="0" smtClean="0"/>
-              <a:t>Techniques</a:t>
-            </a:r>
-          </a:p>
-          <a:p>
             <a:pPr lvl="1"/>
             <a:r>
-              <a:rPr lang="en-US" dirty="0" smtClean="0"/>
-              <a:t>K-nearest </a:t>
-            </a:r>
-            <a:r>
-              <a:rPr lang="en-US" dirty="0" smtClean="0"/>
-              <a:t>neighbor</a:t>
+              <a:rPr lang="en-US" i="1" dirty="0" smtClean="0">
+                <a:solidFill>
+                  <a:schemeClr val="accent1"/>
+                </a:solidFill>
+              </a:rPr>
+              <a:t>Error rate of</a:t>
             </a:r>
           </a:p>
           <a:p>
             <a:pPr lvl="1"/>
             <a:r>
-              <a:rPr lang="en-US" dirty="0" smtClean="0"/>
-              <a:t>Logistic regression</a:t>
+              <a:rPr lang="en-US" i="1" dirty="0" smtClean="0">
+                <a:solidFill>
+                  <a:schemeClr val="accent1"/>
+                </a:solidFill>
+              </a:rPr>
+              <a:t>K-Nearest Neighbor model </a:t>
             </a:r>
           </a:p>
           <a:p>
             <a:pPr lvl="1"/>
             <a:r>
-              <a:rPr lang="en-US" dirty="0" smtClean="0"/>
-              <a:t>Discriminant analysis</a:t>
-            </a:r>
-          </a:p>
+              <a:rPr lang="en-US" i="1" dirty="0" smtClean="0">
+                <a:solidFill>
+                  <a:schemeClr val="accent1"/>
+                </a:solidFill>
+              </a:rPr>
+              <a:t>was 18.3%</a:t>
+            </a:r>
+            <a:endParaRPr lang="en-US" i="1" dirty="0">
+              <a:solidFill>
+                <a:schemeClr val="accent1"/>
+              </a:solidFill>
+            </a:endParaRPr>
+          </a:p>
+        </p:txBody>
+      </p:sp>
+      <p:sp>
+        <p:nvSpPr>
+          <p:cNvPr id="11" name="Rectangle 10"/>
+          <p:cNvSpPr/>
+          <p:nvPr/>
+        </p:nvSpPr>
+        <p:spPr>
+          <a:xfrm>
+            <a:off x="2810182" y="5539376"/>
+            <a:ext cx="7366970" cy="830997"/>
+          </a:xfrm>
+          <a:prstGeom prst="rect">
+            <a:avLst/>
+          </a:prstGeom>
+        </p:spPr>
+        <p:txBody>
+          <a:bodyPr wrap="square">
+            <a:spAutoFit/>
+          </a:bodyPr>
+          <a:lstStyle/>
           <a:p>
             <a:pPr lvl="1"/>
             <a:r>
-              <a:rPr lang="en-US" dirty="0" smtClean="0"/>
-              <a:t>Naïve Bayesian</a:t>
+              <a:rPr lang="en-US" sz="2400" b="1" i="1" dirty="0" smtClean="0"/>
+              <a:t>Why is Error rate not the best measure</a:t>
             </a:r>
           </a:p>
           <a:p>
             <a:pPr lvl="1"/>
             <a:r>
-              <a:rPr lang="en-US" dirty="0" smtClean="0"/>
-              <a:t>Neural networks</a:t>
-            </a:r>
-          </a:p>
-          <a:p>
-            <a:pPr lvl="1"/>
-            <a:r>
-              <a:rPr lang="en-US" dirty="0" smtClean="0"/>
-              <a:t>Classification tree</a:t>
-            </a:r>
-            <a:endParaRPr lang="en-US" dirty="0"/>
+              <a:rPr lang="en-US" sz="2400" b="1" i="1" dirty="0" smtClean="0"/>
+              <a:t> of model accuracy here?</a:t>
+            </a:r>
+            <a:endParaRPr lang="en-US" sz="2400" b="1" i="1" dirty="0"/>
           </a:p>
         </p:txBody>
       </p:sp>
     </p:spTree>
     <p:extLst>
       <p:ext uri="{BB962C8B-B14F-4D97-AF65-F5344CB8AC3E}">
-        <p14:creationId xmlns:p14="http://schemas.microsoft.com/office/powerpoint/2010/main" val="1332911498"/>
+        <p14:creationId xmlns:p14="http://schemas.microsoft.com/office/powerpoint/2010/main" val="1313093697"/>
       </p:ext>
     </p:extLst>
   </p:cSld>
@@ -6664,7 +6935,7 @@
           <a:p>
             <a:r>
               <a:rPr lang="en-US" dirty="0" smtClean="0"/>
-              <a:t>New Methods</a:t>
+              <a:t>Model Accuracy</a:t>
             </a:r>
             <a:endParaRPr lang="en-US" dirty="0"/>
           </a:p>
@@ -6680,7 +6951,12 @@
             <p:ph idx="1"/>
           </p:nvPr>
         </p:nvSpPr>
-        <p:spPr/>
+        <p:spPr>
+          <a:xfrm>
+            <a:off x="1484310" y="1594938"/>
+            <a:ext cx="10018713" cy="3124201"/>
+          </a:xfrm>
+        </p:spPr>
         <p:txBody>
           <a:bodyPr>
             <a:normAutofit/>
@@ -6688,44 +6964,43 @@
           <a:lstStyle/>
           <a:p>
             <a:r>
-              <a:rPr lang="en-US" dirty="0"/>
-              <a:t>Feature selection &amp; </a:t>
-            </a:r>
-            <a:r>
               <a:rPr lang="en-US" dirty="0" smtClean="0"/>
-              <a:t>addition</a:t>
+              <a:t>Only 22% of cardholders default, so {</a:t>
+            </a:r>
+            <a:r>
+              <a:rPr lang="en-US" dirty="0" smtClean="0"/>
+              <a:t>ŷ = 0} yields similar error rate to models</a:t>
             </a:r>
             <a:endParaRPr lang="en-US" dirty="0" smtClean="0"/>
           </a:p>
           <a:p>
             <a:r>
               <a:rPr lang="en-US" dirty="0" smtClean="0"/>
-              <a:t>10-fold cross validation versus 50/50 split</a:t>
+              <a:t>Better measures: area </a:t>
+            </a:r>
+            <a:r>
+              <a:rPr lang="en-US" dirty="0" smtClean="0"/>
+              <a:t>ratio of lift </a:t>
+            </a:r>
+            <a:r>
+              <a:rPr lang="en-US" dirty="0" smtClean="0"/>
+              <a:t>chart, area-under-curve of ROC chart</a:t>
             </a:r>
             <a:endParaRPr lang="en-US" dirty="0" smtClean="0"/>
           </a:p>
           <a:p>
-            <a:r>
-              <a:rPr lang="en-US" dirty="0"/>
-              <a:t>[SVM</a:t>
-            </a:r>
-            <a:r>
-              <a:rPr lang="en-US" dirty="0" smtClean="0"/>
-              <a:t>?] , [PCA w/ Random forest?]</a:t>
-            </a:r>
-          </a:p>
-          <a:p>
-            <a:r>
-              <a:rPr lang="en-US" dirty="0" smtClean="0"/>
-              <a:t>Evaluation Measure</a:t>
-            </a:r>
+            <a:pPr lvl="1"/>
+            <a:endParaRPr lang="en-US" dirty="0" smtClean="0"/>
+          </a:p>
+          <a:p>
+            <a:endParaRPr lang="en-US" dirty="0" smtClean="0"/>
           </a:p>
         </p:txBody>
       </p:sp>
     </p:spTree>
     <p:extLst>
       <p:ext uri="{BB962C8B-B14F-4D97-AF65-F5344CB8AC3E}">
-        <p14:creationId xmlns:p14="http://schemas.microsoft.com/office/powerpoint/2010/main" val="1726699464"/>
+        <p14:creationId xmlns:p14="http://schemas.microsoft.com/office/powerpoint/2010/main" val="1252872857"/>
       </p:ext>
     </p:extLst>
   </p:cSld>
@@ -6776,11 +7051,7 @@
           <a:p>
             <a:r>
               <a:rPr lang="en-US" dirty="0" smtClean="0"/>
-              <a:t>Experiment </a:t>
-            </a:r>
-            <a:r>
-              <a:rPr lang="en-US" smtClean="0"/>
-              <a:t>Comparison Analysis</a:t>
+              <a:t>Baseline Methods</a:t>
             </a:r>
             <a:endParaRPr lang="en-US" dirty="0"/>
           </a:p>
@@ -6799,22 +7070,70 @@
         <p:spPr/>
         <p:txBody>
           <a:bodyPr>
-            <a:normAutofit/>
+            <a:normAutofit fontScale="92500" lnSpcReduction="20000"/>
           </a:bodyPr>
           <a:lstStyle/>
           <a:p>
             <a:r>
+              <a:rPr lang="en-US" dirty="0"/>
+              <a:t>Data split into 2 groups, model training and validation</a:t>
+            </a:r>
+          </a:p>
+          <a:p>
+            <a:r>
               <a:rPr lang="en-US" dirty="0" smtClean="0"/>
-              <a:t>[]</a:t>
-            </a:r>
-            <a:endParaRPr lang="en-US" dirty="0" smtClean="0"/>
+              <a:t>Techniques</a:t>
+            </a:r>
+          </a:p>
+          <a:p>
+            <a:pPr lvl="1"/>
+            <a:r>
+              <a:rPr lang="en-US" dirty="0" smtClean="0"/>
+              <a:t>K-nearest neighbor</a:t>
+            </a:r>
+          </a:p>
+          <a:p>
+            <a:pPr lvl="1"/>
+            <a:r>
+              <a:rPr lang="en-US" dirty="0" smtClean="0"/>
+              <a:t>Logistic regression</a:t>
+            </a:r>
+          </a:p>
+          <a:p>
+            <a:pPr lvl="1"/>
+            <a:r>
+              <a:rPr lang="en-US" dirty="0" smtClean="0"/>
+              <a:t>Discriminant analysis</a:t>
+            </a:r>
+          </a:p>
+          <a:p>
+            <a:pPr lvl="1"/>
+            <a:r>
+              <a:rPr lang="en-US" dirty="0" smtClean="0"/>
+              <a:t>Naïve Bayesian</a:t>
+            </a:r>
+          </a:p>
+          <a:p>
+            <a:pPr lvl="1"/>
+            <a:r>
+              <a:rPr lang="en-US" dirty="0" smtClean="0"/>
+              <a:t>Neural networks</a:t>
+            </a:r>
+          </a:p>
+          <a:p>
+            <a:pPr lvl="1"/>
+            <a:r>
+              <a:rPr lang="en-US" dirty="0" smtClean="0"/>
+              <a:t>Classification tree</a:t>
+            </a:r>
+            <a:endParaRPr lang="en-US" dirty="0"/>
           </a:p>
         </p:txBody>
       </p:sp>
     </p:spTree>
     <p:extLst>
       <p:ext uri="{BB962C8B-B14F-4D97-AF65-F5344CB8AC3E}">
-        <p14:creationId xmlns:p14="http://schemas.microsoft.com/office/powerpoint/2010/main" val="941982666"/>
+        <p14:creationId xmlns:p14="http://schemas.microsoft.com/office/powerpoint/2010/main" val="1332911498"/>
       </p:ext>
     </p:extLst>
   </p:cSld>
@@ -6865,7 +7184,7 @@
           <a:p>
             <a:r>
               <a:rPr lang="en-US" dirty="0" smtClean="0"/>
-              <a:t>Conclusion</a:t>
+              <a:t>New Methods</a:t>
             </a:r>
             <a:endParaRPr lang="en-US" dirty="0"/>
           </a:p>
@@ -6889,10 +7208,202 @@
           <a:lstStyle/>
           <a:p>
             <a:r>
+              <a:rPr lang="en-US" dirty="0"/>
+              <a:t>Feature selection &amp; </a:t>
+            </a:r>
+            <a:r>
+              <a:rPr lang="en-US" dirty="0" smtClean="0"/>
+              <a:t>addition</a:t>
+            </a:r>
+          </a:p>
+          <a:p>
+            <a:r>
+              <a:rPr lang="en-US" dirty="0" smtClean="0"/>
+              <a:t>10-fold cross validation versus 50/50 split</a:t>
+            </a:r>
+          </a:p>
+          <a:p>
+            <a:r>
+              <a:rPr lang="en-US" dirty="0"/>
+              <a:t>[SVM</a:t>
+            </a:r>
+            <a:r>
+              <a:rPr lang="en-US" dirty="0" smtClean="0"/>
+              <a:t>?] , [PCA w/ Random forest?]</a:t>
+            </a:r>
+          </a:p>
+          <a:p>
+            <a:r>
+              <a:rPr lang="en-US" dirty="0" smtClean="0"/>
+              <a:t>Evaluation Measure</a:t>
+            </a:r>
+          </a:p>
+        </p:txBody>
+      </p:sp>
+    </p:spTree>
+    <p:extLst>
+      <p:ext uri="{BB962C8B-B14F-4D97-AF65-F5344CB8AC3E}">
+        <p14:creationId xmlns:p14="http://schemas.microsoft.com/office/powerpoint/2010/main" val="1726699464"/>
+      </p:ext>
+    </p:extLst>
+  </p:cSld>
+  <p:clrMapOvr>
+    <a:masterClrMapping/>
+  </p:clrMapOvr>
+  <p:timing>
+    <p:tnLst>
+      <p:par>
+        <p:cTn id="1" dur="indefinite" restart="never" nodeType="tmRoot"/>
+      </p:par>
+    </p:tnLst>
+  </p:timing>
+</p:sld>
+</file>
+
+<file path=ppt/slides/slide8.xml><?xml version="1.0" encoding="utf-8"?>
+<p:sld xmlns:a="http://schemas.openxmlformats.org/drawingml/2006/main" xmlns:r="http://schemas.openxmlformats.org/officeDocument/2006/relationships" xmlns:p="http://schemas.openxmlformats.org/presentationml/2006/main">
+  <p:cSld>
+    <p:spTree>
+      <p:nvGrpSpPr>
+        <p:cNvPr id="1" name=""/>
+        <p:cNvGrpSpPr/>
+        <p:nvPr/>
+      </p:nvGrpSpPr>
+      <p:grpSpPr>
+        <a:xfrm>
+          <a:off x="0" y="0"/>
+          <a:ext cx="0" cy="0"/>
+          <a:chOff x="0" y="0"/>
+          <a:chExt cx="0" cy="0"/>
+        </a:xfrm>
+      </p:grpSpPr>
+      <p:sp>
+        <p:nvSpPr>
+          <p:cNvPr id="2" name="Title 1"/>
+          <p:cNvSpPr>
+            <a:spLocks noGrp="1"/>
+          </p:cNvSpPr>
+          <p:nvPr>
+            <p:ph type="title"/>
+          </p:nvPr>
+        </p:nvSpPr>
+        <p:spPr/>
+        <p:txBody>
+          <a:bodyPr/>
+          <a:lstStyle/>
+          <a:p>
+            <a:r>
+              <a:rPr lang="en-US" dirty="0" smtClean="0"/>
+              <a:t>Experiment </a:t>
+            </a:r>
+            <a:r>
+              <a:rPr lang="en-US" smtClean="0"/>
+              <a:t>Comparison Analysis</a:t>
+            </a:r>
+            <a:endParaRPr lang="en-US" dirty="0"/>
+          </a:p>
+        </p:txBody>
+      </p:sp>
+      <p:sp>
+        <p:nvSpPr>
+          <p:cNvPr id="3" name="Content Placeholder 2"/>
+          <p:cNvSpPr>
+            <a:spLocks noGrp="1"/>
+          </p:cNvSpPr>
+          <p:nvPr>
+            <p:ph idx="1"/>
+          </p:nvPr>
+        </p:nvSpPr>
+        <p:spPr/>
+        <p:txBody>
+          <a:bodyPr>
+            <a:normAutofit/>
+          </a:bodyPr>
+          <a:lstStyle/>
+          <a:p>
+            <a:r>
               <a:rPr lang="en-US" dirty="0" smtClean="0"/>
               <a:t>[]</a:t>
             </a:r>
           </a:p>
+        </p:txBody>
+      </p:sp>
+    </p:spTree>
+    <p:extLst>
+      <p:ext uri="{BB962C8B-B14F-4D97-AF65-F5344CB8AC3E}">
+        <p14:creationId xmlns:p14="http://schemas.microsoft.com/office/powerpoint/2010/main" val="941982666"/>
+      </p:ext>
+    </p:extLst>
+  </p:cSld>
+  <p:clrMapOvr>
+    <a:masterClrMapping/>
+  </p:clrMapOvr>
+  <p:timing>
+    <p:tnLst>
+      <p:par>
+        <p:cTn id="1" dur="indefinite" restart="never" nodeType="tmRoot"/>
+      </p:par>
+    </p:tnLst>
+  </p:timing>
+</p:sld>
+</file>
+
+<file path=ppt/slides/slide9.xml><?xml version="1.0" encoding="utf-8"?>
+<p:sld xmlns:a="http://schemas.openxmlformats.org/drawingml/2006/main" xmlns:r="http://schemas.openxmlformats.org/officeDocument/2006/relationships" xmlns:p="http://schemas.openxmlformats.org/presentationml/2006/main">
+  <p:cSld>
+    <p:spTree>
+      <p:nvGrpSpPr>
+        <p:cNvPr id="1" name=""/>
+        <p:cNvGrpSpPr/>
+        <p:nvPr/>
+      </p:nvGrpSpPr>
+      <p:grpSpPr>
+        <a:xfrm>
+          <a:off x="0" y="0"/>
+          <a:ext cx="0" cy="0"/>
+          <a:chOff x="0" y="0"/>
+          <a:chExt cx="0" cy="0"/>
+        </a:xfrm>
+      </p:grpSpPr>
+      <p:sp>
+        <p:nvSpPr>
+          <p:cNvPr id="2" name="Title 1"/>
+          <p:cNvSpPr>
+            <a:spLocks noGrp="1"/>
+          </p:cNvSpPr>
+          <p:nvPr>
+            <p:ph type="title"/>
+          </p:nvPr>
+        </p:nvSpPr>
+        <p:spPr/>
+        <p:txBody>
+          <a:bodyPr/>
+          <a:lstStyle/>
+          <a:p>
+            <a:r>
+              <a:rPr lang="en-US" dirty="0" smtClean="0"/>
+              <a:t>Conclusion</a:t>
+            </a:r>
+            <a:endParaRPr lang="en-US" dirty="0"/>
+          </a:p>
+        </p:txBody>
+      </p:sp>
+      <p:sp>
+        <p:nvSpPr>
+          <p:cNvPr id="3" name="Content Placeholder 2"/>
+          <p:cNvSpPr>
+            <a:spLocks noGrp="1"/>
+          </p:cNvSpPr>
+          <p:nvPr>
+            <p:ph idx="1"/>
+          </p:nvPr>
+        </p:nvSpPr>
+        <p:spPr/>
+        <p:txBody>
+          <a:bodyPr>
+            <a:normAutofit/>
+          </a:bodyPr>
+          <a:lstStyle/>
           <a:p>
             <a:r>
               <a:rPr lang="en-US" dirty="0" smtClean="0"/>
@@ -6908,6 +7419,12 @@
           <a:p>
             <a:r>
               <a:rPr lang="en-US" dirty="0" smtClean="0"/>
+              <a:t>[]</a:t>
+            </a:r>
+          </a:p>
+          <a:p>
+            <a:r>
+              <a:rPr lang="en-US" dirty="0" smtClean="0"/>
               <a:t>References:</a:t>
             </a:r>
           </a:p>
@@ -6915,15 +7432,7 @@
             <a:pPr lvl="1"/>
             <a:r>
               <a:rPr lang="en-US" dirty="0"/>
-              <a:t>I. </a:t>
-            </a:r>
-            <a:r>
-              <a:rPr lang="en-US" dirty="0" err="1"/>
-              <a:t>Yeh</a:t>
-            </a:r>
-            <a:r>
-              <a:rPr lang="en-US" dirty="0"/>
-              <a:t>, C. Lien, The comparisons of data mining techniques for the predictive accuracy of probability of default of credit card clients, Expert Systems with Applications 36 (2) (2008) 2473–2480</a:t>
+              <a:t>I. Yeh, C. Lien, The comparisons of data mining techniques for the predictive accuracy of probability of default of credit card clients, Expert Systems with Applications 36 (2) (2008) 2473–2480</a:t>
             </a:r>
             <a:r>
               <a:rPr lang="en-US" dirty="0" smtClean="0"/>

</xml_diff>